<commit_message>
updated slides with specific tests
</commit_message>
<xml_diff>
--- a/slides/Final Review - Trajectory Generation.pptx
+++ b/slides/Final Review - Trajectory Generation.pptx
@@ -24,6 +24,7 @@
     <p:sldId id="264" r:id="rId17"/>
     <p:sldId id="265" r:id="rId18"/>
     <p:sldId id="266" r:id="rId19"/>
+    <p:sldId id="267" r:id="rId20"/>
   </p:sldIdLst>
   <p:sldSz cx="12192000" cy="6858000"/>
   <p:notesSz cx="7023100" cy="9309100"/>
@@ -271,7 +272,7 @@
           <a:bodyPr lIns="0" rIns="0" tIns="0" bIns="0" anchor="b"/>
           <a:p>
             <a:pPr algn="r"/>
-            <a:fld id="{DF9B839A-AC2B-498E-A8EC-B8AA3AB27E59}" type="slidenum">
+            <a:fld id="{29F18406-1BE1-46AF-BEBB-4E0F789425DA}" type="slidenum">
               <a:rPr b="0" lang="en-US" sz="1400" spc="-1" strike="noStrike">
                 <a:solidFill>
                   <a:srgbClr val="000000"/>
@@ -324,7 +325,7 @@
       </p:grpSpPr>
       <p:sp>
         <p:nvSpPr>
-          <p:cNvPr id="349" name="PlaceHolder 1"/>
+          <p:cNvPr id="361" name="PlaceHolder 1"/>
           <p:cNvSpPr>
             <a:spLocks noGrp="1"/>
           </p:cNvSpPr>
@@ -360,7 +361,7 @@
       </p:sp>
       <p:sp>
         <p:nvSpPr>
-          <p:cNvPr id="350" name="CustomShape 2"/>
+          <p:cNvPr id="362" name="CustomShape 2"/>
           <p:cNvSpPr/>
           <p:nvPr/>
         </p:nvSpPr>
@@ -386,7 +387,7 @@
       </p:sp>
       <p:sp>
         <p:nvSpPr>
-          <p:cNvPr id="351" name="CustomShape 3"/>
+          <p:cNvPr id="363" name="CustomShape 3"/>
           <p:cNvSpPr/>
           <p:nvPr/>
         </p:nvSpPr>
@@ -448,7 +449,7 @@
       </p:sp>
       <p:sp>
         <p:nvSpPr>
-          <p:cNvPr id="352" name="CustomShape 4"/>
+          <p:cNvPr id="364" name="CustomShape 4"/>
           <p:cNvSpPr/>
           <p:nvPr/>
         </p:nvSpPr>
@@ -479,7 +480,7 @@
                 <a:spcPct val="100000"/>
               </a:lnSpc>
             </a:pPr>
-            <a:fld id="{241C0BB3-077B-4A14-A0B5-C2E89987B516}" type="slidenum">
+            <a:fld id="{2515FD6E-BEE0-42A8-BC98-ADC7B8BAE01F}" type="slidenum">
               <a:rPr b="0" lang="en-US" sz="1200" spc="-1" strike="noStrike">
                 <a:solidFill>
                   <a:srgbClr val="000000"/>
@@ -492,7 +493,7 @@
                 <a:latin typeface="+mn-lt"/>
                 <a:ea typeface="+mn-ea"/>
               </a:rPr>
-              <a:t>1</a:t>
+              <a:t>&lt;number&gt;</a:t>
             </a:fld>
             <a:endParaRPr b="0" lang="en-US" sz="1800" spc="-1" strike="noStrike">
               <a:solidFill>
@@ -532,7 +533,7 @@
       </p:grpSpPr>
       <p:sp>
         <p:nvSpPr>
-          <p:cNvPr id="353" name="PlaceHolder 1"/>
+          <p:cNvPr id="365" name="PlaceHolder 1"/>
           <p:cNvSpPr>
             <a:spLocks noGrp="1"/>
           </p:cNvSpPr>
@@ -568,7 +569,7 @@
       </p:sp>
       <p:sp>
         <p:nvSpPr>
-          <p:cNvPr id="354" name="CustomShape 2"/>
+          <p:cNvPr id="366" name="CustomShape 2"/>
           <p:cNvSpPr/>
           <p:nvPr/>
         </p:nvSpPr>
@@ -594,7 +595,7 @@
       </p:sp>
       <p:sp>
         <p:nvSpPr>
-          <p:cNvPr id="355" name="CustomShape 3"/>
+          <p:cNvPr id="367" name="CustomShape 3"/>
           <p:cNvSpPr/>
           <p:nvPr/>
         </p:nvSpPr>
@@ -656,7 +657,7 @@
       </p:sp>
       <p:sp>
         <p:nvSpPr>
-          <p:cNvPr id="356" name="CustomShape 4"/>
+          <p:cNvPr id="368" name="CustomShape 4"/>
           <p:cNvSpPr/>
           <p:nvPr/>
         </p:nvSpPr>
@@ -687,7 +688,7 @@
                 <a:spcPct val="100000"/>
               </a:lnSpc>
             </a:pPr>
-            <a:fld id="{34C769EC-2774-45F4-BCCF-4358CA78836D}" type="slidenum">
+            <a:fld id="{1459D217-DA65-481F-A0E6-3712CD563329}" type="slidenum">
               <a:rPr b="0" lang="en-US" sz="1200" spc="-1" strike="noStrike">
                 <a:solidFill>
                   <a:srgbClr val="000000"/>
@@ -700,7 +701,215 @@
                 <a:latin typeface="+mn-lt"/>
                 <a:ea typeface="+mn-ea"/>
               </a:rPr>
-              <a:t>1</a:t>
+              <a:t>&lt;number&gt;</a:t>
+            </a:fld>
+            <a:endParaRPr b="0" lang="en-US" sz="1800" spc="-1" strike="noStrike">
+              <a:solidFill>
+                <a:srgbClr val="000000"/>
+              </a:solidFill>
+              <a:uFill>
+                <a:solidFill>
+                  <a:srgbClr val="ffffff"/>
+                </a:solidFill>
+              </a:uFill>
+              <a:latin typeface="Arial"/>
+            </a:endParaRPr>
+          </a:p>
+        </p:txBody>
+      </p:sp>
+    </p:spTree>
+  </p:cSld>
+</p:notes>
+</file>
+
+<file path=ppt/notesSlides/notesSlide12.xml><?xml version="1.0" encoding="utf-8"?>
+<p:notes xmlns:a="http://schemas.openxmlformats.org/drawingml/2006/main" xmlns:p="http://schemas.openxmlformats.org/presentationml/2006/main" xmlns:r="http://schemas.openxmlformats.org/officeDocument/2006/relationships" xmlns:p14="http://schemas.microsoft.com/office/powerpoint/2010/main" xmlns:p15="http://schemas.microsoft.com/office/powerpoint/2012/main" xmlns:mc="http://schemas.openxmlformats.org/markup-compatibility/2006">
+  <p:cSld>
+    <p:spTree>
+      <p:nvGrpSpPr>
+        <p:cNvPr id="1" name=""/>
+        <p:cNvGrpSpPr/>
+        <p:nvPr/>
+      </p:nvGrpSpPr>
+      <p:grpSpPr>
+        <a:xfrm>
+          <a:off x="0" y="0"/>
+          <a:ext cx="0" cy="0"/>
+          <a:chOff x="0" y="0"/>
+          <a:chExt cx="0" cy="0"/>
+        </a:xfrm>
+      </p:grpSpPr>
+      <p:sp>
+        <p:nvSpPr>
+          <p:cNvPr id="369" name="PlaceHolder 1"/>
+          <p:cNvSpPr>
+            <a:spLocks noGrp="1"/>
+          </p:cNvSpPr>
+          <p:nvPr>
+            <p:ph type="body"/>
+          </p:nvPr>
+        </p:nvSpPr>
+        <p:spPr>
+          <a:xfrm>
+            <a:off x="701640" y="4421160"/>
+            <a:ext cx="5618880" cy="4188600"/>
+          </a:xfrm>
+          <a:prstGeom prst="rect">
+            <a:avLst/>
+          </a:prstGeom>
+        </p:spPr>
+        <p:txBody>
+          <a:bodyPr lIns="93240" rIns="93240" tIns="46800" bIns="46800"/>
+          <a:p>
+            <a:endParaRPr b="0" lang="en-US" sz="2000" spc="-1" strike="noStrike">
+              <a:solidFill>
+                <a:srgbClr val="000000"/>
+              </a:solidFill>
+              <a:uFill>
+                <a:solidFill>
+                  <a:srgbClr val="ffffff"/>
+                </a:solidFill>
+              </a:uFill>
+              <a:latin typeface="Arial"/>
+            </a:endParaRPr>
+          </a:p>
+        </p:txBody>
+      </p:sp>
+      <p:sp>
+        <p:nvSpPr>
+          <p:cNvPr id="370" name="CustomShape 2"/>
+          <p:cNvSpPr/>
+          <p:nvPr/>
+        </p:nvSpPr>
+        <p:spPr>
+          <a:xfrm>
+            <a:off x="0" y="0"/>
+            <a:ext cx="3042360" cy="464400"/>
+          </a:xfrm>
+          <a:prstGeom prst="rect">
+            <a:avLst/>
+          </a:prstGeom>
+          <a:noFill/>
+          <a:ln>
+            <a:noFill/>
+          </a:ln>
+        </p:spPr>
+        <p:style>
+          <a:lnRef idx="0"/>
+          <a:fillRef idx="0"/>
+          <a:effectRef idx="0"/>
+          <a:fontRef idx="minor"/>
+        </p:style>
+      </p:sp>
+      <p:sp>
+        <p:nvSpPr>
+          <p:cNvPr id="371" name="CustomShape 3"/>
+          <p:cNvSpPr/>
+          <p:nvPr/>
+        </p:nvSpPr>
+        <p:spPr>
+          <a:xfrm>
+            <a:off x="0" y="8842320"/>
+            <a:ext cx="7022520" cy="464400"/>
+          </a:xfrm>
+          <a:prstGeom prst="rect">
+            <a:avLst/>
+          </a:prstGeom>
+          <a:noFill/>
+          <a:ln>
+            <a:noFill/>
+          </a:ln>
+        </p:spPr>
+        <p:style>
+          <a:lnRef idx="0"/>
+          <a:fillRef idx="0"/>
+          <a:effectRef idx="0"/>
+          <a:fontRef idx="minor"/>
+        </p:style>
+        <p:txBody>
+          <a:bodyPr lIns="93240" rIns="93240" tIns="46800" bIns="46800" anchor="b"/>
+          <a:p>
+            <a:pPr>
+              <a:lnSpc>
+                <a:spcPct val="100000"/>
+              </a:lnSpc>
+            </a:pPr>
+            <a:r>
+              <a:rPr b="0" lang="en-US" sz="700" spc="-1" strike="noStrike">
+                <a:solidFill>
+                  <a:srgbClr val="7f7f7f"/>
+                </a:solidFill>
+                <a:uFill>
+                  <a:solidFill>
+                    <a:srgbClr val="ffffff"/>
+                  </a:solidFill>
+                </a:uFill>
+                <a:latin typeface="Arial"/>
+                <a:ea typeface="+mn-ea"/>
+              </a:rPr>
+              <a:t>Honeywell Internal</a:t>
+            </a:r>
+            <a:endParaRPr b="0" lang="en-US" sz="1800" spc="-1" strike="noStrike">
+              <a:solidFill>
+                <a:srgbClr val="000000"/>
+              </a:solidFill>
+              <a:uFill>
+                <a:solidFill>
+                  <a:srgbClr val="ffffff"/>
+                </a:solidFill>
+              </a:uFill>
+              <a:latin typeface="Arial"/>
+            </a:endParaRPr>
+          </a:p>
+        </p:txBody>
+      </p:sp>
+      <p:sp>
+        <p:nvSpPr>
+          <p:cNvPr id="372" name="CustomShape 4"/>
+          <p:cNvSpPr/>
+          <p:nvPr/>
+        </p:nvSpPr>
+        <p:spPr>
+          <a:xfrm>
+            <a:off x="3978360" y="8842320"/>
+            <a:ext cx="3042360" cy="464400"/>
+          </a:xfrm>
+          <a:prstGeom prst="rect">
+            <a:avLst/>
+          </a:prstGeom>
+          <a:noFill/>
+          <a:ln>
+            <a:noFill/>
+          </a:ln>
+        </p:spPr>
+        <p:style>
+          <a:lnRef idx="0"/>
+          <a:fillRef idx="0"/>
+          <a:effectRef idx="0"/>
+          <a:fontRef idx="minor"/>
+        </p:style>
+        <p:txBody>
+          <a:bodyPr lIns="93240" rIns="93240" tIns="46800" bIns="46800" anchor="b"/>
+          <a:p>
+            <a:pPr algn="r">
+              <a:lnSpc>
+                <a:spcPct val="100000"/>
+              </a:lnSpc>
+            </a:pPr>
+            <a:fld id="{D0A2D33E-2648-4381-80CA-5DA64820E97B}" type="slidenum">
+              <a:rPr b="0" lang="en-US" sz="1200" spc="-1" strike="noStrike">
+                <a:solidFill>
+                  <a:srgbClr val="000000"/>
+                </a:solidFill>
+                <a:uFill>
+                  <a:solidFill>
+                    <a:srgbClr val="ffffff"/>
+                  </a:solidFill>
+                </a:uFill>
+                <a:latin typeface="+mn-lt"/>
+                <a:ea typeface="+mn-ea"/>
+              </a:rPr>
+              <a:t>&lt;number&gt;</a:t>
             </a:fld>
             <a:endParaRPr b="0" lang="en-US" sz="1800" spc="-1" strike="noStrike">
               <a:solidFill>
@@ -740,7 +949,7 @@
       </p:grpSpPr>
       <p:sp>
         <p:nvSpPr>
-          <p:cNvPr id="317" name="PlaceHolder 1"/>
+          <p:cNvPr id="329" name="PlaceHolder 1"/>
           <p:cNvSpPr>
             <a:spLocks noGrp="1"/>
           </p:cNvSpPr>
@@ -776,7 +985,7 @@
       </p:sp>
       <p:sp>
         <p:nvSpPr>
-          <p:cNvPr id="318" name="CustomShape 2"/>
+          <p:cNvPr id="330" name="CustomShape 2"/>
           <p:cNvSpPr/>
           <p:nvPr/>
         </p:nvSpPr>
@@ -802,7 +1011,7 @@
       </p:sp>
       <p:sp>
         <p:nvSpPr>
-          <p:cNvPr id="319" name="CustomShape 3"/>
+          <p:cNvPr id="331" name="CustomShape 3"/>
           <p:cNvSpPr/>
           <p:nvPr/>
         </p:nvSpPr>
@@ -864,7 +1073,7 @@
       </p:sp>
       <p:sp>
         <p:nvSpPr>
-          <p:cNvPr id="320" name="CustomShape 4"/>
+          <p:cNvPr id="332" name="CustomShape 4"/>
           <p:cNvSpPr/>
           <p:nvPr/>
         </p:nvSpPr>
@@ -895,7 +1104,7 @@
                 <a:spcPct val="100000"/>
               </a:lnSpc>
             </a:pPr>
-            <a:fld id="{50DD1205-77D7-4DA7-A188-B6EA1A44B13E}" type="slidenum">
+            <a:fld id="{E3D3E1A6-BEEC-405F-A53B-7B28C9E07534}" type="slidenum">
               <a:rPr b="0" lang="en-US" sz="1200" spc="-1" strike="noStrike">
                 <a:solidFill>
                   <a:srgbClr val="000000"/>
@@ -908,7 +1117,7 @@
                 <a:latin typeface="+mn-lt"/>
                 <a:ea typeface="+mn-ea"/>
               </a:rPr>
-              <a:t>1</a:t>
+              <a:t>&lt;number&gt;</a:t>
             </a:fld>
             <a:endParaRPr b="0" lang="en-US" sz="1800" spc="-1" strike="noStrike">
               <a:solidFill>
@@ -948,7 +1157,7 @@
       </p:grpSpPr>
       <p:sp>
         <p:nvSpPr>
-          <p:cNvPr id="321" name="PlaceHolder 1"/>
+          <p:cNvPr id="333" name="PlaceHolder 1"/>
           <p:cNvSpPr>
             <a:spLocks noGrp="1"/>
           </p:cNvSpPr>
@@ -984,7 +1193,7 @@
       </p:sp>
       <p:sp>
         <p:nvSpPr>
-          <p:cNvPr id="322" name="CustomShape 2"/>
+          <p:cNvPr id="334" name="CustomShape 2"/>
           <p:cNvSpPr/>
           <p:nvPr/>
         </p:nvSpPr>
@@ -1010,7 +1219,7 @@
       </p:sp>
       <p:sp>
         <p:nvSpPr>
-          <p:cNvPr id="323" name="CustomShape 3"/>
+          <p:cNvPr id="335" name="CustomShape 3"/>
           <p:cNvSpPr/>
           <p:nvPr/>
         </p:nvSpPr>
@@ -1072,7 +1281,7 @@
       </p:sp>
       <p:sp>
         <p:nvSpPr>
-          <p:cNvPr id="324" name="CustomShape 4"/>
+          <p:cNvPr id="336" name="CustomShape 4"/>
           <p:cNvSpPr/>
           <p:nvPr/>
         </p:nvSpPr>
@@ -1103,7 +1312,7 @@
                 <a:spcPct val="100000"/>
               </a:lnSpc>
             </a:pPr>
-            <a:fld id="{9253C6D0-F698-4515-862F-68CA1D95BE32}" type="slidenum">
+            <a:fld id="{2834A9E3-0DD1-460E-9FFE-E7338B2E4A86}" type="slidenum">
               <a:rPr b="0" lang="en-US" sz="1200" spc="-1" strike="noStrike">
                 <a:solidFill>
                   <a:srgbClr val="000000"/>
@@ -1116,7 +1325,7 @@
                 <a:latin typeface="+mn-lt"/>
                 <a:ea typeface="+mn-ea"/>
               </a:rPr>
-              <a:t>1</a:t>
+              <a:t>&lt;number&gt;</a:t>
             </a:fld>
             <a:endParaRPr b="0" lang="en-US" sz="1800" spc="-1" strike="noStrike">
               <a:solidFill>
@@ -1156,7 +1365,7 @@
       </p:grpSpPr>
       <p:sp>
         <p:nvSpPr>
-          <p:cNvPr id="325" name="PlaceHolder 1"/>
+          <p:cNvPr id="337" name="PlaceHolder 1"/>
           <p:cNvSpPr>
             <a:spLocks noGrp="1"/>
           </p:cNvSpPr>
@@ -1192,7 +1401,7 @@
       </p:sp>
       <p:sp>
         <p:nvSpPr>
-          <p:cNvPr id="326" name="CustomShape 2"/>
+          <p:cNvPr id="338" name="CustomShape 2"/>
           <p:cNvSpPr/>
           <p:nvPr/>
         </p:nvSpPr>
@@ -1218,7 +1427,7 @@
       </p:sp>
       <p:sp>
         <p:nvSpPr>
-          <p:cNvPr id="327" name="CustomShape 3"/>
+          <p:cNvPr id="339" name="CustomShape 3"/>
           <p:cNvSpPr/>
           <p:nvPr/>
         </p:nvSpPr>
@@ -1280,7 +1489,7 @@
       </p:sp>
       <p:sp>
         <p:nvSpPr>
-          <p:cNvPr id="328" name="CustomShape 4"/>
+          <p:cNvPr id="340" name="CustomShape 4"/>
           <p:cNvSpPr/>
           <p:nvPr/>
         </p:nvSpPr>
@@ -1311,7 +1520,7 @@
                 <a:spcPct val="100000"/>
               </a:lnSpc>
             </a:pPr>
-            <a:fld id="{AB46A0A6-C2D5-4D31-B137-B0F9F1970392}" type="slidenum">
+            <a:fld id="{538337A1-B2B8-4D5A-8059-7FFCB709306D}" type="slidenum">
               <a:rPr b="0" lang="en-US" sz="1200" spc="-1" strike="noStrike">
                 <a:solidFill>
                   <a:srgbClr val="000000"/>
@@ -1324,7 +1533,7 @@
                 <a:latin typeface="+mn-lt"/>
                 <a:ea typeface="+mn-ea"/>
               </a:rPr>
-              <a:t>1</a:t>
+              <a:t>&lt;number&gt;</a:t>
             </a:fld>
             <a:endParaRPr b="0" lang="en-US" sz="1800" spc="-1" strike="noStrike">
               <a:solidFill>
@@ -1364,7 +1573,7 @@
       </p:grpSpPr>
       <p:sp>
         <p:nvSpPr>
-          <p:cNvPr id="329" name="PlaceHolder 1"/>
+          <p:cNvPr id="341" name="PlaceHolder 1"/>
           <p:cNvSpPr>
             <a:spLocks noGrp="1"/>
           </p:cNvSpPr>
@@ -1400,7 +1609,7 @@
       </p:sp>
       <p:sp>
         <p:nvSpPr>
-          <p:cNvPr id="330" name="CustomShape 2"/>
+          <p:cNvPr id="342" name="CustomShape 2"/>
           <p:cNvSpPr/>
           <p:nvPr/>
         </p:nvSpPr>
@@ -1426,7 +1635,7 @@
       </p:sp>
       <p:sp>
         <p:nvSpPr>
-          <p:cNvPr id="331" name="CustomShape 3"/>
+          <p:cNvPr id="343" name="CustomShape 3"/>
           <p:cNvSpPr/>
           <p:nvPr/>
         </p:nvSpPr>
@@ -1488,7 +1697,7 @@
       </p:sp>
       <p:sp>
         <p:nvSpPr>
-          <p:cNvPr id="332" name="CustomShape 4"/>
+          <p:cNvPr id="344" name="CustomShape 4"/>
           <p:cNvSpPr/>
           <p:nvPr/>
         </p:nvSpPr>
@@ -1519,7 +1728,7 @@
                 <a:spcPct val="100000"/>
               </a:lnSpc>
             </a:pPr>
-            <a:fld id="{5E4BD6CB-46AB-4295-A712-2AC350387E11}" type="slidenum">
+            <a:fld id="{BE17D68C-8F07-4F76-A075-6EEBCA2D5F97}" type="slidenum">
               <a:rPr b="0" lang="en-US" sz="1200" spc="-1" strike="noStrike">
                 <a:solidFill>
                   <a:srgbClr val="000000"/>
@@ -1532,7 +1741,7 @@
                 <a:latin typeface="+mn-lt"/>
                 <a:ea typeface="+mn-ea"/>
               </a:rPr>
-              <a:t>1</a:t>
+              <a:t>&lt;number&gt;</a:t>
             </a:fld>
             <a:endParaRPr b="0" lang="en-US" sz="1800" spc="-1" strike="noStrike">
               <a:solidFill>
@@ -1572,7 +1781,7 @@
       </p:grpSpPr>
       <p:sp>
         <p:nvSpPr>
-          <p:cNvPr id="333" name="PlaceHolder 1"/>
+          <p:cNvPr id="345" name="PlaceHolder 1"/>
           <p:cNvSpPr>
             <a:spLocks noGrp="1"/>
           </p:cNvSpPr>
@@ -1608,7 +1817,7 @@
       </p:sp>
       <p:sp>
         <p:nvSpPr>
-          <p:cNvPr id="334" name="CustomShape 2"/>
+          <p:cNvPr id="346" name="CustomShape 2"/>
           <p:cNvSpPr/>
           <p:nvPr/>
         </p:nvSpPr>
@@ -1634,7 +1843,7 @@
       </p:sp>
       <p:sp>
         <p:nvSpPr>
-          <p:cNvPr id="335" name="CustomShape 3"/>
+          <p:cNvPr id="347" name="CustomShape 3"/>
           <p:cNvSpPr/>
           <p:nvPr/>
         </p:nvSpPr>
@@ -1696,7 +1905,7 @@
       </p:sp>
       <p:sp>
         <p:nvSpPr>
-          <p:cNvPr id="336" name="CustomShape 4"/>
+          <p:cNvPr id="348" name="CustomShape 4"/>
           <p:cNvSpPr/>
           <p:nvPr/>
         </p:nvSpPr>
@@ -1727,7 +1936,7 @@
                 <a:spcPct val="100000"/>
               </a:lnSpc>
             </a:pPr>
-            <a:fld id="{ED7F6727-D892-4E56-9ED8-3AB048F9E285}" type="slidenum">
+            <a:fld id="{8772A0B9-F0F6-488D-A646-C31896020278}" type="slidenum">
               <a:rPr b="0" lang="en-US" sz="1200" spc="-1" strike="noStrike">
                 <a:solidFill>
                   <a:srgbClr val="000000"/>
@@ -1740,7 +1949,7 @@
                 <a:latin typeface="+mn-lt"/>
                 <a:ea typeface="+mn-ea"/>
               </a:rPr>
-              <a:t>1</a:t>
+              <a:t>&lt;number&gt;</a:t>
             </a:fld>
             <a:endParaRPr b="0" lang="en-US" sz="1800" spc="-1" strike="noStrike">
               <a:solidFill>
@@ -1780,7 +1989,7 @@
       </p:grpSpPr>
       <p:sp>
         <p:nvSpPr>
-          <p:cNvPr id="337" name="PlaceHolder 1"/>
+          <p:cNvPr id="349" name="PlaceHolder 1"/>
           <p:cNvSpPr>
             <a:spLocks noGrp="1"/>
           </p:cNvSpPr>
@@ -1816,7 +2025,7 @@
       </p:sp>
       <p:sp>
         <p:nvSpPr>
-          <p:cNvPr id="338" name="CustomShape 2"/>
+          <p:cNvPr id="350" name="CustomShape 2"/>
           <p:cNvSpPr/>
           <p:nvPr/>
         </p:nvSpPr>
@@ -1842,7 +2051,7 @@
       </p:sp>
       <p:sp>
         <p:nvSpPr>
-          <p:cNvPr id="339" name="CustomShape 3"/>
+          <p:cNvPr id="351" name="CustomShape 3"/>
           <p:cNvSpPr/>
           <p:nvPr/>
         </p:nvSpPr>
@@ -1904,7 +2113,7 @@
       </p:sp>
       <p:sp>
         <p:nvSpPr>
-          <p:cNvPr id="340" name="CustomShape 4"/>
+          <p:cNvPr id="352" name="CustomShape 4"/>
           <p:cNvSpPr/>
           <p:nvPr/>
         </p:nvSpPr>
@@ -1935,7 +2144,7 @@
                 <a:spcPct val="100000"/>
               </a:lnSpc>
             </a:pPr>
-            <a:fld id="{F3A8A0A0-00F4-49E1-AFD7-3F874EA85145}" type="slidenum">
+            <a:fld id="{3E8904CC-3B3D-4C1E-8DB6-0CF4076DB3E9}" type="slidenum">
               <a:rPr b="0" lang="en-US" sz="1200" spc="-1" strike="noStrike">
                 <a:solidFill>
                   <a:srgbClr val="000000"/>
@@ -1948,7 +2157,7 @@
                 <a:latin typeface="+mn-lt"/>
                 <a:ea typeface="+mn-ea"/>
               </a:rPr>
-              <a:t>1</a:t>
+              <a:t>&lt;number&gt;</a:t>
             </a:fld>
             <a:endParaRPr b="0" lang="en-US" sz="1800" spc="-1" strike="noStrike">
               <a:solidFill>
@@ -1988,7 +2197,7 @@
       </p:grpSpPr>
       <p:sp>
         <p:nvSpPr>
-          <p:cNvPr id="341" name="PlaceHolder 1"/>
+          <p:cNvPr id="353" name="PlaceHolder 1"/>
           <p:cNvSpPr>
             <a:spLocks noGrp="1"/>
           </p:cNvSpPr>
@@ -2024,7 +2233,7 @@
       </p:sp>
       <p:sp>
         <p:nvSpPr>
-          <p:cNvPr id="342" name="CustomShape 2"/>
+          <p:cNvPr id="354" name="CustomShape 2"/>
           <p:cNvSpPr/>
           <p:nvPr/>
         </p:nvSpPr>
@@ -2050,7 +2259,7 @@
       </p:sp>
       <p:sp>
         <p:nvSpPr>
-          <p:cNvPr id="343" name="CustomShape 3"/>
+          <p:cNvPr id="355" name="CustomShape 3"/>
           <p:cNvSpPr/>
           <p:nvPr/>
         </p:nvSpPr>
@@ -2112,7 +2321,7 @@
       </p:sp>
       <p:sp>
         <p:nvSpPr>
-          <p:cNvPr id="344" name="CustomShape 4"/>
+          <p:cNvPr id="356" name="CustomShape 4"/>
           <p:cNvSpPr/>
           <p:nvPr/>
         </p:nvSpPr>
@@ -2143,7 +2352,7 @@
                 <a:spcPct val="100000"/>
               </a:lnSpc>
             </a:pPr>
-            <a:fld id="{71FF28BB-7620-4389-9379-3854E817A02D}" type="slidenum">
+            <a:fld id="{90580207-2409-47B5-9D5E-6F7F6776EF56}" type="slidenum">
               <a:rPr b="0" lang="en-US" sz="1200" spc="-1" strike="noStrike">
                 <a:solidFill>
                   <a:srgbClr val="000000"/>
@@ -2156,7 +2365,7 @@
                 <a:latin typeface="+mn-lt"/>
                 <a:ea typeface="+mn-ea"/>
               </a:rPr>
-              <a:t>1</a:t>
+              <a:t>&lt;number&gt;</a:t>
             </a:fld>
             <a:endParaRPr b="0" lang="en-US" sz="1800" spc="-1" strike="noStrike">
               <a:solidFill>
@@ -2196,7 +2405,7 @@
       </p:grpSpPr>
       <p:sp>
         <p:nvSpPr>
-          <p:cNvPr id="345" name="PlaceHolder 1"/>
+          <p:cNvPr id="357" name="PlaceHolder 1"/>
           <p:cNvSpPr>
             <a:spLocks noGrp="1"/>
           </p:cNvSpPr>
@@ -2232,7 +2441,7 @@
       </p:sp>
       <p:sp>
         <p:nvSpPr>
-          <p:cNvPr id="346" name="CustomShape 2"/>
+          <p:cNvPr id="358" name="CustomShape 2"/>
           <p:cNvSpPr/>
           <p:nvPr/>
         </p:nvSpPr>
@@ -2258,7 +2467,7 @@
       </p:sp>
       <p:sp>
         <p:nvSpPr>
-          <p:cNvPr id="347" name="CustomShape 3"/>
+          <p:cNvPr id="359" name="CustomShape 3"/>
           <p:cNvSpPr/>
           <p:nvPr/>
         </p:nvSpPr>
@@ -2320,7 +2529,7 @@
       </p:sp>
       <p:sp>
         <p:nvSpPr>
-          <p:cNvPr id="348" name="CustomShape 4"/>
+          <p:cNvPr id="360" name="CustomShape 4"/>
           <p:cNvSpPr/>
           <p:nvPr/>
         </p:nvSpPr>
@@ -2351,7 +2560,7 @@
                 <a:spcPct val="100000"/>
               </a:lnSpc>
             </a:pPr>
-            <a:fld id="{42D799B7-76B8-4C53-A7D8-31E205B33A90}" type="slidenum">
+            <a:fld id="{8667C93B-3818-4A2C-9DF9-125D50763823}" type="slidenum">
               <a:rPr b="0" lang="en-US" sz="1200" spc="-1" strike="noStrike">
                 <a:solidFill>
                   <a:srgbClr val="000000"/>
@@ -2364,7 +2573,7 @@
                 <a:latin typeface="+mn-lt"/>
                 <a:ea typeface="+mn-ea"/>
               </a:rPr>
-              <a:t>1</a:t>
+              <a:t>&lt;number&gt;</a:t>
             </a:fld>
             <a:endParaRPr b="0" lang="en-US" sz="1800" spc="-1" strike="noStrike">
               <a:solidFill>
@@ -11853,35 +12062,7 @@
                 </a:uFill>
                 <a:latin typeface="Arial"/>
               </a:rPr>
-              <a:t>Click to edit </a:t>
-            </a:r>
-            <a:r>
-              <a:rPr b="0" lang="en-US" sz="4400" spc="-1" strike="noStrike">
-                <a:solidFill>
-                  <a:srgbClr val="000000"/>
-                </a:solidFill>
-                <a:uFill>
-                  <a:solidFill>
-                    <a:srgbClr val="ffffff"/>
-                  </a:solidFill>
-                </a:uFill>
-                <a:latin typeface="Arial"/>
-              </a:rPr>
-              <a:t>the title text </a:t>
-            </a:r>
-            <a:r>
-              <a:rPr b="0" lang="en-US" sz="4400" spc="-1" strike="noStrike">
-                <a:solidFill>
-                  <a:srgbClr val="000000"/>
-                </a:solidFill>
-                <a:uFill>
-                  <a:solidFill>
-                    <a:srgbClr val="ffffff"/>
-                  </a:solidFill>
-                </a:uFill>
-                <a:latin typeface="Arial"/>
-              </a:rPr>
-              <a:t>format</a:t>
+              <a:t>Click to edit the title text format</a:t>
             </a:r>
             <a:endParaRPr b="0" lang="en-US" sz="4400" spc="-1" strike="noStrike">
               <a:solidFill>
@@ -12437,7 +12618,35 @@
                 </a:uFill>
                 <a:latin typeface="Arial"/>
               </a:rPr>
-              <a:t>Click to edit the title text format</a:t>
+              <a:t>Click to edit </a:t>
+            </a:r>
+            <a:r>
+              <a:rPr b="0" lang="en-US" sz="4400" spc="-1" strike="noStrike">
+                <a:solidFill>
+                  <a:srgbClr val="000000"/>
+                </a:solidFill>
+                <a:uFill>
+                  <a:solidFill>
+                    <a:srgbClr val="ffffff"/>
+                  </a:solidFill>
+                </a:uFill>
+                <a:latin typeface="Arial"/>
+              </a:rPr>
+              <a:t>the title text </a:t>
+            </a:r>
+            <a:r>
+              <a:rPr b="0" lang="en-US" sz="4400" spc="-1" strike="noStrike">
+                <a:solidFill>
+                  <a:srgbClr val="000000"/>
+                </a:solidFill>
+                <a:uFill>
+                  <a:solidFill>
+                    <a:srgbClr val="ffffff"/>
+                  </a:solidFill>
+                </a:uFill>
+                <a:latin typeface="Arial"/>
+              </a:rPr>
+              <a:t>format</a:t>
             </a:r>
             <a:endParaRPr b="0" lang="en-US" sz="4400" spc="-1" strike="noStrike">
               <a:solidFill>
@@ -14610,7 +14819,7 @@
       </p:grpSpPr>
       <p:sp>
         <p:nvSpPr>
-          <p:cNvPr id="313" name="CustomShape 1"/>
+          <p:cNvPr id="323" name="CustomShape 1"/>
           <p:cNvSpPr/>
           <p:nvPr/>
         </p:nvSpPr>
@@ -14672,7 +14881,7 @@
       </p:sp>
       <p:sp>
         <p:nvSpPr>
-          <p:cNvPr id="314" name="CustomShape 2"/>
+          <p:cNvPr id="324" name="CustomShape 2"/>
           <p:cNvSpPr/>
           <p:nvPr/>
         </p:nvSpPr>
@@ -14783,7 +14992,7 @@
       </p:grpSpPr>
       <p:sp>
         <p:nvSpPr>
-          <p:cNvPr id="315" name="CustomShape 1"/>
+          <p:cNvPr id="325" name="CustomShape 1"/>
           <p:cNvSpPr/>
           <p:nvPr/>
         </p:nvSpPr>
@@ -14845,7 +15054,7 @@
       </p:sp>
       <p:sp>
         <p:nvSpPr>
-          <p:cNvPr id="316" name="CustomShape 2"/>
+          <p:cNvPr id="326" name="CustomShape 2"/>
           <p:cNvSpPr/>
           <p:nvPr/>
         </p:nvSpPr>
@@ -14914,6 +15123,179 @@
           <p:childTnLst>
             <p:seq>
               <p:cTn id="22" nodeType="mainSeq"/>
+              <p:prevCondLst>
+                <p:cond delay="0" evt="onPrev">
+                  <p:tgtEl>
+                    <p:sldTgt/>
+                  </p:tgtEl>
+                </p:cond>
+              </p:prevCondLst>
+              <p:nextCondLst>
+                <p:cond delay="0" evt="onNext">
+                  <p:tgtEl>
+                    <p:sldTgt/>
+                  </p:tgtEl>
+                </p:cond>
+              </p:nextCondLst>
+            </p:seq>
+          </p:childTnLst>
+        </p:cTn>
+      </p:par>
+    </p:tnLst>
+  </p:timing>
+</p:sld>
+</file>
+
+<file path=ppt/slides/slide12.xml><?xml version="1.0" encoding="utf-8"?>
+<p:sld xmlns:a="http://schemas.openxmlformats.org/drawingml/2006/main" xmlns:p="http://schemas.openxmlformats.org/presentationml/2006/main" xmlns:r="http://schemas.openxmlformats.org/officeDocument/2006/relationships" xmlns:p14="http://schemas.microsoft.com/office/powerpoint/2010/main" xmlns:p15="http://schemas.microsoft.com/office/powerpoint/2012/main" xmlns:mc="http://schemas.openxmlformats.org/markup-compatibility/2006">
+  <p:cSld>
+    <p:spTree>
+      <p:nvGrpSpPr>
+        <p:cNvPr id="1" name=""/>
+        <p:cNvGrpSpPr/>
+        <p:nvPr/>
+      </p:nvGrpSpPr>
+      <p:grpSpPr>
+        <a:xfrm>
+          <a:off x="0" y="0"/>
+          <a:ext cx="0" cy="0"/>
+          <a:chOff x="0" y="0"/>
+          <a:chExt cx="0" cy="0"/>
+        </a:xfrm>
+      </p:grpSpPr>
+      <p:sp>
+        <p:nvSpPr>
+          <p:cNvPr id="327" name="CustomShape 1"/>
+          <p:cNvSpPr/>
+          <p:nvPr/>
+        </p:nvSpPr>
+        <p:spPr>
+          <a:xfrm>
+            <a:off x="712800" y="357120"/>
+            <a:ext cx="10479960" cy="497880"/>
+          </a:xfrm>
+          <a:prstGeom prst="rect">
+            <a:avLst/>
+          </a:prstGeom>
+          <a:noFill/>
+          <a:ln>
+            <a:noFill/>
+          </a:ln>
+        </p:spPr>
+        <p:style>
+          <a:lnRef idx="0"/>
+          <a:fillRef idx="0"/>
+          <a:effectRef idx="0"/>
+          <a:fontRef idx="minor"/>
+        </p:style>
+        <p:txBody>
+          <a:bodyPr lIns="90000" rIns="90000" tIns="45000" bIns="45000"/>
+          <a:p>
+            <a:pPr>
+              <a:lnSpc>
+                <a:spcPct val="100000"/>
+              </a:lnSpc>
+            </a:pPr>
+            <a:r>
+              <a:rPr b="1" lang="en-US" sz="2800" spc="-1" strike="noStrike">
+                <a:solidFill>
+                  <a:srgbClr val="000000"/>
+                </a:solidFill>
+                <a:uFill>
+                  <a:solidFill>
+                    <a:srgbClr val="ffffff"/>
+                  </a:solidFill>
+                </a:uFill>
+                <a:latin typeface="Arial"/>
+                <a:ea typeface="Arial"/>
+              </a:rPr>
+              <a:t>Q&amp;A</a:t>
+            </a:r>
+            <a:endParaRPr b="0" lang="en-US" sz="1800" spc="-1" strike="noStrike">
+              <a:solidFill>
+                <a:srgbClr val="000000"/>
+              </a:solidFill>
+              <a:uFill>
+                <a:solidFill>
+                  <a:srgbClr val="ffffff"/>
+                </a:solidFill>
+              </a:uFill>
+              <a:latin typeface="Arial"/>
+            </a:endParaRPr>
+          </a:p>
+        </p:txBody>
+      </p:sp>
+      <p:sp>
+        <p:nvSpPr>
+          <p:cNvPr id="328" name="CustomShape 2"/>
+          <p:cNvSpPr/>
+          <p:nvPr/>
+        </p:nvSpPr>
+        <p:spPr>
+          <a:xfrm>
+            <a:off x="1650960" y="6645240"/>
+            <a:ext cx="8889120" cy="196560"/>
+          </a:xfrm>
+          <a:prstGeom prst="rect">
+            <a:avLst/>
+          </a:prstGeom>
+          <a:noFill/>
+          <a:ln>
+            <a:noFill/>
+          </a:ln>
+        </p:spPr>
+        <p:style>
+          <a:lnRef idx="0"/>
+          <a:fillRef idx="0"/>
+          <a:effectRef idx="0"/>
+          <a:fontRef idx="minor"/>
+        </p:style>
+        <p:txBody>
+          <a:bodyPr lIns="90000" rIns="90000" tIns="45000" bIns="45000"/>
+          <a:p>
+            <a:pPr>
+              <a:lnSpc>
+                <a:spcPct val="100000"/>
+              </a:lnSpc>
+            </a:pPr>
+            <a:r>
+              <a:rPr b="0" lang="en-US" sz="700" spc="-1" strike="noStrike">
+                <a:solidFill>
+                  <a:srgbClr val="7f7f7f"/>
+                </a:solidFill>
+                <a:uFill>
+                  <a:solidFill>
+                    <a:srgbClr val="ffffff"/>
+                  </a:solidFill>
+                </a:uFill>
+                <a:latin typeface="Arial"/>
+                <a:ea typeface="DejaVu Sans"/>
+              </a:rPr>
+              <a:t>Honeywell Internal</a:t>
+            </a:r>
+            <a:endParaRPr b="0" lang="en-US" sz="1800" spc="-1" strike="noStrike">
+              <a:solidFill>
+                <a:srgbClr val="000000"/>
+              </a:solidFill>
+              <a:uFill>
+                <a:solidFill>
+                  <a:srgbClr val="ffffff"/>
+                </a:solidFill>
+              </a:uFill>
+              <a:latin typeface="Arial"/>
+            </a:endParaRPr>
+          </a:p>
+        </p:txBody>
+      </p:sp>
+    </p:spTree>
+  </p:cSld>
+  <p:timing>
+    <p:tnLst>
+      <p:par>
+        <p:cTn id="23" dur="indefinite" restart="never" nodeType="tmRoot">
+          <p:childTnLst>
+            <p:seq>
+              <p:cTn id="24" nodeType="mainSeq"/>
               <p:prevCondLst>
                 <p:cond delay="0" evt="onPrev">
                   <p:tgtEl>
@@ -16979,6 +17361,45 @@
                 <a:latin typeface="Arial"/>
                 <a:ea typeface="Arial"/>
               </a:rPr>
+              <a:t> </a:t>
+            </a:r>
+            <a:endParaRPr b="0" lang="en-US" sz="1800" spc="-1" strike="noStrike">
+              <a:solidFill>
+                <a:srgbClr val="000000"/>
+              </a:solidFill>
+              <a:uFill>
+                <a:solidFill>
+                  <a:srgbClr val="ffffff"/>
+                </a:solidFill>
+              </a:uFill>
+              <a:latin typeface="Arial"/>
+            </a:endParaRPr>
+          </a:p>
+          <a:p>
+            <a:pPr marL="432000" indent="-323640">
+              <a:lnSpc>
+                <a:spcPct val="100000"/>
+              </a:lnSpc>
+              <a:buClr>
+                <a:srgbClr val="000000"/>
+              </a:buClr>
+              <a:buSzPct val="45000"/>
+              <a:buFont typeface="Wingdings" charset="2"/>
+              <a:buChar char=""/>
+            </a:pPr>
+            <a:r>
+              <a:rPr b="0" lang="en-US" sz="1600" spc="-1" strike="noStrike">
+                <a:solidFill>
+                  <a:srgbClr val="000000"/>
+                </a:solidFill>
+                <a:uFill>
+                  <a:solidFill>
+                    <a:srgbClr val="ffffff"/>
+                  </a:solidFill>
+                </a:uFill>
+                <a:latin typeface="Arial"/>
+                <a:ea typeface="Arial"/>
+              </a:rPr>
               <a:t>Advantage of MPC Trajectory Generator</a:t>
             </a:r>
             <a:endParaRPr b="0" lang="en-US" sz="1800" spc="-1" strike="noStrike">
@@ -17057,7 +17478,85 @@
                 <a:latin typeface="Arial"/>
                 <a:ea typeface="Arial"/>
               </a:rPr>
+              <a:t> </a:t>
+            </a:r>
+            <a:endParaRPr b="0" lang="en-US" sz="1800" spc="-1" strike="noStrike">
+              <a:solidFill>
+                <a:srgbClr val="000000"/>
+              </a:solidFill>
+              <a:uFill>
+                <a:solidFill>
+                  <a:srgbClr val="ffffff"/>
+                </a:solidFill>
+              </a:uFill>
+              <a:latin typeface="Arial"/>
+            </a:endParaRPr>
+          </a:p>
+          <a:p>
+            <a:pPr marL="432000" indent="-323640">
+              <a:lnSpc>
+                <a:spcPct val="100000"/>
+              </a:lnSpc>
+              <a:buClr>
+                <a:srgbClr val="000000"/>
+              </a:buClr>
+              <a:buSzPct val="45000"/>
+              <a:buFont typeface="Wingdings" charset="2"/>
+              <a:buChar char=""/>
+            </a:pPr>
+            <a:r>
+              <a:rPr b="0" lang="en-US" sz="1600" spc="-1" strike="noStrike">
+                <a:solidFill>
+                  <a:srgbClr val="000000"/>
+                </a:solidFill>
+                <a:uFill>
+                  <a:solidFill>
+                    <a:srgbClr val="ffffff"/>
+                  </a:solidFill>
+                </a:uFill>
+                <a:latin typeface="Arial"/>
+                <a:ea typeface="Arial"/>
+              </a:rPr>
               <a:t>Performed design trade-off studies (mid-term)</a:t>
+            </a:r>
+            <a:endParaRPr b="0" lang="en-US" sz="1800" spc="-1" strike="noStrike">
+              <a:solidFill>
+                <a:srgbClr val="000000"/>
+              </a:solidFill>
+              <a:uFill>
+                <a:solidFill>
+                  <a:srgbClr val="ffffff"/>
+                </a:solidFill>
+              </a:uFill>
+              <a:latin typeface="Arial"/>
+            </a:endParaRPr>
+          </a:p>
+          <a:p>
+            <a:pPr marL="432000" indent="-323640">
+              <a:lnSpc>
+                <a:spcPct val="100000"/>
+              </a:lnSpc>
+              <a:buClr>
+                <a:srgbClr val="000000"/>
+              </a:buClr>
+              <a:buSzPct val="45000"/>
+              <a:buFont typeface="Wingdings" charset="2"/>
+              <a:buChar char=""/>
+            </a:pPr>
+            <a:r>
+              <a:rPr b="0" lang="en-US" sz="1600" spc="-1" strike="noStrike">
+                <a:solidFill>
+                  <a:srgbClr val="000000"/>
+                </a:solidFill>
+                <a:uFill>
+                  <a:solidFill>
+                    <a:srgbClr val="ffffff"/>
+                  </a:solidFill>
+                </a:uFill>
+                <a:latin typeface="Arial"/>
+                <a:ea typeface="Arial"/>
+              </a:rPr>
+              <a:t> </a:t>
             </a:r>
             <a:endParaRPr b="0" lang="en-US" sz="1800" spc="-1" strike="noStrike">
               <a:solidFill>
@@ -17097,6 +17596,45 @@
                 <a:ea typeface="Arial"/>
               </a:rPr>
               <a:t>Performed comparative study showing 2X to 3X reduction in computation time using MPC Trajectory Generator</a:t>
+            </a:r>
+            <a:endParaRPr b="0" lang="en-US" sz="1800" spc="-1" strike="noStrike">
+              <a:solidFill>
+                <a:srgbClr val="000000"/>
+              </a:solidFill>
+              <a:uFill>
+                <a:solidFill>
+                  <a:srgbClr val="ffffff"/>
+                </a:solidFill>
+              </a:uFill>
+              <a:latin typeface="Arial"/>
+            </a:endParaRPr>
+          </a:p>
+          <a:p>
+            <a:pPr marL="432000" indent="-323640">
+              <a:lnSpc>
+                <a:spcPct val="100000"/>
+              </a:lnSpc>
+              <a:buClr>
+                <a:srgbClr val="000000"/>
+              </a:buClr>
+              <a:buSzPct val="45000"/>
+              <a:buFont typeface="Wingdings" charset="2"/>
+              <a:buChar char=""/>
+            </a:pPr>
+            <a:r>
+              <a:rPr b="0" lang="en-US" sz="1600" spc="-1" strike="noStrike">
+                <a:solidFill>
+                  <a:srgbClr val="000000"/>
+                </a:solidFill>
+                <a:uFill>
+                  <a:solidFill>
+                    <a:srgbClr val="ffffff"/>
+                  </a:solidFill>
+                </a:uFill>
+                <a:latin typeface="Arial"/>
+                <a:ea typeface="Arial"/>
+              </a:rPr>
+              <a:t> </a:t>
             </a:r>
             <a:endParaRPr b="0" lang="en-US" sz="1800" spc="-1" strike="noStrike">
               <a:solidFill>
@@ -18518,7 +19056,7 @@
                 <a:latin typeface="Arial"/>
                 <a:ea typeface="Arial"/>
               </a:rPr>
-              <a:t>MPC Test Cases</a:t>
+              <a:t>MPC Randomized Test Cases</a:t>
             </a:r>
             <a:endParaRPr b="0" lang="en-US" sz="1800" spc="-1" strike="noStrike">
               <a:solidFill>
@@ -18944,7 +19482,7 @@
                 <a:latin typeface="Arial"/>
                 <a:ea typeface="Arial"/>
               </a:rPr>
-              <a:t>MPC Test Cases</a:t>
+              <a:t>MPC Randomized Test Cases</a:t>
             </a:r>
             <a:endParaRPr b="0" lang="en-US" sz="1800" spc="-1" strike="noStrike">
               <a:solidFill>
@@ -19409,9 +19947,55 @@
           <a:chExt cx="0" cy="0"/>
         </a:xfrm>
       </p:grpSpPr>
-      <p:sp>
-        <p:nvSpPr>
-          <p:cNvPr id="306" name="CustomShape 1"/>
+      <p:pic>
+        <p:nvPicPr>
+          <p:cNvPr id="306" name="" descr=""/>
+          <p:cNvPicPr/>
+          <p:nvPr/>
+        </p:nvPicPr>
+        <p:blipFill>
+          <a:blip r:embed="rId1"/>
+          <a:stretch/>
+        </p:blipFill>
+        <p:spPr>
+          <a:xfrm>
+            <a:off x="1536120" y="1828800"/>
+            <a:ext cx="3584520" cy="5029200"/>
+          </a:xfrm>
+          <a:prstGeom prst="rect">
+            <a:avLst/>
+          </a:prstGeom>
+          <a:ln>
+            <a:noFill/>
+          </a:ln>
+        </p:spPr>
+      </p:pic>
+      <p:pic>
+        <p:nvPicPr>
+          <p:cNvPr id="307" name="" descr=""/>
+          <p:cNvPicPr/>
+          <p:nvPr/>
+        </p:nvPicPr>
+        <p:blipFill>
+          <a:blip r:embed="rId2"/>
+          <a:stretch/>
+        </p:blipFill>
+        <p:spPr>
+          <a:xfrm>
+            <a:off x="6748200" y="1828800"/>
+            <a:ext cx="3584520" cy="5029200"/>
+          </a:xfrm>
+          <a:prstGeom prst="rect">
+            <a:avLst/>
+          </a:prstGeom>
+          <a:ln>
+            <a:noFill/>
+          </a:ln>
+        </p:spPr>
+      </p:pic>
+      <p:sp>
+        <p:nvSpPr>
+          <p:cNvPr id="308" name="CustomShape 1"/>
           <p:cNvSpPr/>
           <p:nvPr/>
         </p:nvSpPr>
@@ -19455,62 +20039,10 @@
                 <a:latin typeface="Arial"/>
                 <a:ea typeface="Arial"/>
               </a:rPr>
-              <a:t>Future Work</a:t>
+              <a:t>MPC Specific Test </a:t>
             </a:r>
-            <a:endParaRPr b="0" lang="en-US" sz="1800" spc="-1" strike="noStrike">
-              <a:solidFill>
-                <a:srgbClr val="000000"/>
-              </a:solidFill>
-              <a:uFill>
-                <a:solidFill>
-                  <a:srgbClr val="ffffff"/>
-                </a:solidFill>
-              </a:uFill>
-              <a:latin typeface="Arial"/>
-            </a:endParaRPr>
-          </a:p>
-        </p:txBody>
-      </p:sp>
-      <p:sp>
-        <p:nvSpPr>
-          <p:cNvPr id="307" name="CustomShape 2"/>
-          <p:cNvSpPr/>
-          <p:nvPr/>
-        </p:nvSpPr>
-        <p:spPr>
-          <a:xfrm>
-            <a:off x="712800" y="992520"/>
-            <a:ext cx="9802800" cy="5221800"/>
-          </a:xfrm>
-          <a:prstGeom prst="rect">
-            <a:avLst/>
-          </a:prstGeom>
-          <a:noFill/>
-          <a:ln>
-            <a:noFill/>
-          </a:ln>
-        </p:spPr>
-        <p:style>
-          <a:lnRef idx="0"/>
-          <a:fillRef idx="0"/>
-          <a:effectRef idx="0"/>
-          <a:fontRef idx="minor"/>
-        </p:style>
-        <p:txBody>
-          <a:bodyPr lIns="90000" rIns="90000" tIns="45000" bIns="45000"/>
-          <a:p>
-            <a:pPr marL="169920" indent="-169200">
-              <a:lnSpc>
-                <a:spcPct val="100000"/>
-              </a:lnSpc>
-              <a:buClr>
-                <a:srgbClr val="c00000"/>
-              </a:buClr>
-              <a:buFont typeface="Arial"/>
-              <a:buChar char="•"/>
-            </a:pPr>
             <a:r>
-              <a:rPr b="0" lang="en-US" sz="2000" spc="-1" strike="noStrike">
+              <a:rPr b="1" lang="en-US" sz="2800" spc="-1" strike="noStrike">
                 <a:solidFill>
                   <a:srgbClr val="000000"/>
                 </a:solidFill>
@@ -19522,7 +20054,7 @@
                 <a:latin typeface="Arial"/>
                 <a:ea typeface="Arial"/>
               </a:rPr>
-              <a:t>MPC Trajectory Generator solves a non-linear optimization problem which cannot guarantee a solution at every time step.</a:t>
+              <a:t>Cases</a:t>
             </a:r>
             <a:endParaRPr b="0" lang="en-US" sz="1800" spc="-1" strike="noStrike">
               <a:solidFill>
@@ -19536,281 +20068,11 @@
               <a:latin typeface="Arial"/>
             </a:endParaRPr>
           </a:p>
-          <a:p>
-            <a:pPr marL="169920" indent="-169200">
-              <a:lnSpc>
-                <a:spcPct val="100000"/>
-              </a:lnSpc>
-              <a:buClr>
-                <a:srgbClr val="c00000"/>
-              </a:buClr>
-              <a:buFont typeface="Arial"/>
-              <a:buChar char="•"/>
-            </a:pPr>
-            <a:r>
-              <a:rPr b="0" lang="en-US" sz="2000" spc="-1" strike="noStrike">
-                <a:solidFill>
-                  <a:srgbClr val="000000"/>
-                </a:solidFill>
-                <a:uFill>
-                  <a:solidFill>
-                    <a:srgbClr val="ffffff"/>
-                  </a:solidFill>
-                </a:uFill>
-                <a:latin typeface="Arial"/>
-                <a:ea typeface="Arial"/>
-              </a:rPr>
-              <a:t>To obtained a guaranteed solution we will look at the following approaches:</a:t>
-            </a:r>
-            <a:endParaRPr b="0" lang="en-US" sz="1800" spc="-1" strike="noStrike">
-              <a:solidFill>
-                <a:srgbClr val="000000"/>
-              </a:solidFill>
-              <a:uFill>
-                <a:solidFill>
-                  <a:srgbClr val="ffffff"/>
-                </a:solidFill>
-              </a:uFill>
-              <a:latin typeface="Arial"/>
-            </a:endParaRPr>
-          </a:p>
-          <a:p>
-            <a:pPr lvl="1" marL="864000" indent="-323640">
-              <a:lnSpc>
-                <a:spcPct val="100000"/>
-              </a:lnSpc>
-              <a:buClr>
-                <a:srgbClr val="000000"/>
-              </a:buClr>
-              <a:buSzPct val="75000"/>
-              <a:buFont typeface="Symbol"/>
-              <a:buChar char=""/>
-            </a:pPr>
-            <a:r>
-              <a:rPr b="0" lang="en-US" sz="1600" spc="-1" strike="noStrike">
-                <a:solidFill>
-                  <a:srgbClr val="000000"/>
-                </a:solidFill>
-                <a:uFill>
-                  <a:solidFill>
-                    <a:srgbClr val="ffffff"/>
-                  </a:solidFill>
-                </a:uFill>
-                <a:latin typeface="Arial"/>
-                <a:ea typeface="Arial"/>
-              </a:rPr>
-              <a:t>Approximate optimization problem formulation using linearized vehicle dynamics and linear constraints</a:t>
-            </a:r>
-            <a:endParaRPr b="0" lang="en-US" sz="1800" spc="-1" strike="noStrike">
-              <a:solidFill>
-                <a:srgbClr val="000000"/>
-              </a:solidFill>
-              <a:uFill>
-                <a:solidFill>
-                  <a:srgbClr val="ffffff"/>
-                </a:solidFill>
-              </a:uFill>
-              <a:latin typeface="Arial"/>
-            </a:endParaRPr>
-          </a:p>
-          <a:p>
-            <a:pPr lvl="1" marL="864000" indent="-323640">
-              <a:lnSpc>
-                <a:spcPct val="100000"/>
-              </a:lnSpc>
-              <a:buClr>
-                <a:srgbClr val="000000"/>
-              </a:buClr>
-              <a:buSzPct val="75000"/>
-              <a:buFont typeface="Symbol"/>
-              <a:buChar char=""/>
-            </a:pPr>
-            <a:r>
-              <a:rPr b="0" lang="en-US" sz="1600" spc="-1" strike="noStrike">
-                <a:solidFill>
-                  <a:srgbClr val="000000"/>
-                </a:solidFill>
-                <a:uFill>
-                  <a:solidFill>
-                    <a:srgbClr val="ffffff"/>
-                  </a:solidFill>
-                </a:uFill>
-                <a:latin typeface="Arial"/>
-                <a:ea typeface="Arial"/>
-              </a:rPr>
-              <a:t>Continue on the MPC path computed in the previous time step and run a  less costly global planner to re-initialize the MPC problem</a:t>
-            </a:r>
-            <a:endParaRPr b="0" lang="en-US" sz="1800" spc="-1" strike="noStrike">
-              <a:solidFill>
-                <a:srgbClr val="000000"/>
-              </a:solidFill>
-              <a:uFill>
-                <a:solidFill>
-                  <a:srgbClr val="ffffff"/>
-                </a:solidFill>
-              </a:uFill>
-              <a:latin typeface="Arial"/>
-            </a:endParaRPr>
-          </a:p>
-          <a:p>
-            <a:pPr marL="169920" indent="-169200">
-              <a:lnSpc>
-                <a:spcPct val="100000"/>
-              </a:lnSpc>
-              <a:buClr>
-                <a:srgbClr val="c00000"/>
-              </a:buClr>
-              <a:buFont typeface="Arial"/>
-              <a:buChar char="•"/>
-            </a:pPr>
-            <a:r>
-              <a:rPr b="0" lang="en-US" sz="2000" spc="-1" strike="noStrike">
-                <a:solidFill>
-                  <a:srgbClr val="000000"/>
-                </a:solidFill>
-                <a:uFill>
-                  <a:solidFill>
-                    <a:srgbClr val="ffffff"/>
-                  </a:solidFill>
-                </a:uFill>
-                <a:latin typeface="Arial"/>
-                <a:ea typeface="Arial"/>
-              </a:rPr>
-              <a:t>Current MPC trajectory generator is not optimized to run in real time</a:t>
-            </a:r>
-            <a:endParaRPr b="0" lang="en-US" sz="1800" spc="-1" strike="noStrike">
-              <a:solidFill>
-                <a:srgbClr val="000000"/>
-              </a:solidFill>
-              <a:uFill>
-                <a:solidFill>
-                  <a:srgbClr val="ffffff"/>
-                </a:solidFill>
-              </a:uFill>
-              <a:latin typeface="Arial"/>
-            </a:endParaRPr>
-          </a:p>
-          <a:p>
-            <a:pPr marL="169920" indent="-169200">
-              <a:lnSpc>
-                <a:spcPct val="100000"/>
-              </a:lnSpc>
-              <a:buClr>
-                <a:srgbClr val="c00000"/>
-              </a:buClr>
-              <a:buFont typeface="Arial"/>
-              <a:buChar char="•"/>
-            </a:pPr>
-            <a:r>
-              <a:rPr b="0" lang="en-US" sz="2000" spc="-1" strike="noStrike">
-                <a:solidFill>
-                  <a:srgbClr val="000000"/>
-                </a:solidFill>
-                <a:uFill>
-                  <a:solidFill>
-                    <a:srgbClr val="ffffff"/>
-                  </a:solidFill>
-                </a:uFill>
-                <a:latin typeface="Arial"/>
-                <a:ea typeface="Arial"/>
-              </a:rPr>
-              <a:t>To obtain real-time performance we will look at the following approaches:</a:t>
-            </a:r>
-            <a:endParaRPr b="0" lang="en-US" sz="1800" spc="-1" strike="noStrike">
-              <a:solidFill>
-                <a:srgbClr val="000000"/>
-              </a:solidFill>
-              <a:uFill>
-                <a:solidFill>
-                  <a:srgbClr val="ffffff"/>
-                </a:solidFill>
-              </a:uFill>
-              <a:latin typeface="Arial"/>
-            </a:endParaRPr>
-          </a:p>
-          <a:p>
-            <a:pPr lvl="1" marL="864000" indent="-323640">
-              <a:lnSpc>
-                <a:spcPct val="100000"/>
-              </a:lnSpc>
-              <a:buClr>
-                <a:srgbClr val="000000"/>
-              </a:buClr>
-              <a:buSzPct val="75000"/>
-              <a:buFont typeface="Symbol"/>
-              <a:buChar char=""/>
-            </a:pPr>
-            <a:r>
-              <a:rPr b="0" lang="en-US" sz="1600" spc="-1" strike="noStrike">
-                <a:solidFill>
-                  <a:srgbClr val="000000"/>
-                </a:solidFill>
-                <a:uFill>
-                  <a:solidFill>
-                    <a:srgbClr val="ffffff"/>
-                  </a:solidFill>
-                </a:uFill>
-                <a:latin typeface="Arial"/>
-                <a:ea typeface="Arial"/>
-              </a:rPr>
-              <a:t>Use near-optimal values to reduce the number of iterations</a:t>
-            </a:r>
-            <a:endParaRPr b="0" lang="en-US" sz="1800" spc="-1" strike="noStrike">
-              <a:solidFill>
-                <a:srgbClr val="000000"/>
-              </a:solidFill>
-              <a:uFill>
-                <a:solidFill>
-                  <a:srgbClr val="ffffff"/>
-                </a:solidFill>
-              </a:uFill>
-              <a:latin typeface="Arial"/>
-            </a:endParaRPr>
-          </a:p>
-          <a:p>
-            <a:pPr lvl="1" marL="864000" indent="-323640">
-              <a:lnSpc>
-                <a:spcPct val="100000"/>
-              </a:lnSpc>
-              <a:buClr>
-                <a:srgbClr val="000000"/>
-              </a:buClr>
-              <a:buSzPct val="75000"/>
-              <a:buFont typeface="Symbol"/>
-              <a:buChar char=""/>
-            </a:pPr>
-            <a:r>
-              <a:rPr b="0" lang="en-US" sz="1600" spc="-1" strike="noStrike">
-                <a:solidFill>
-                  <a:srgbClr val="000000"/>
-                </a:solidFill>
-                <a:uFill>
-                  <a:solidFill>
-                    <a:srgbClr val="ffffff"/>
-                  </a:solidFill>
-                </a:uFill>
-                <a:latin typeface="Arial"/>
-                <a:ea typeface="Arial"/>
-              </a:rPr>
-              <a:t>Use efficient linear solvers which is used by the nonlinear optimizer </a:t>
-            </a:r>
-            <a:endParaRPr b="0" lang="en-US" sz="1800" spc="-1" strike="noStrike">
-              <a:solidFill>
-                <a:srgbClr val="000000"/>
-              </a:solidFill>
-              <a:uFill>
-                <a:solidFill>
-                  <a:srgbClr val="ffffff"/>
-                </a:solidFill>
-              </a:uFill>
-              <a:latin typeface="Arial"/>
-            </a:endParaRPr>
-          </a:p>
-        </p:txBody>
-      </p:sp>
-      <p:sp>
-        <p:nvSpPr>
-          <p:cNvPr id="308" name="CustomShape 3"/>
+        </p:txBody>
+      </p:sp>
+      <p:sp>
+        <p:nvSpPr>
+          <p:cNvPr id="309" name="CustomShape 2"/>
           <p:cNvSpPr/>
           <p:nvPr/>
         </p:nvSpPr>
@@ -19854,7 +20116,232 @@
                 <a:latin typeface="Arial"/>
                 <a:ea typeface="DejaVu Sans"/>
               </a:rPr>
-              <a:t>Honeywell Internal</a:t>
+              <a:t>H</a:t>
+            </a:r>
+            <a:r>
+              <a:rPr b="0" lang="en-US" sz="700" spc="-1" strike="noStrike">
+                <a:solidFill>
+                  <a:srgbClr val="7f7f7f"/>
+                </a:solidFill>
+                <a:uFill>
+                  <a:solidFill>
+                    <a:srgbClr val="ffffff"/>
+                  </a:solidFill>
+                </a:uFill>
+                <a:latin typeface="Arial"/>
+                <a:ea typeface="DejaVu Sans"/>
+              </a:rPr>
+              <a:t>o</a:t>
+            </a:r>
+            <a:r>
+              <a:rPr b="0" lang="en-US" sz="700" spc="-1" strike="noStrike">
+                <a:solidFill>
+                  <a:srgbClr val="7f7f7f"/>
+                </a:solidFill>
+                <a:uFill>
+                  <a:solidFill>
+                    <a:srgbClr val="ffffff"/>
+                  </a:solidFill>
+                </a:uFill>
+                <a:latin typeface="Arial"/>
+                <a:ea typeface="DejaVu Sans"/>
+              </a:rPr>
+              <a:t>n</a:t>
+            </a:r>
+            <a:r>
+              <a:rPr b="0" lang="en-US" sz="700" spc="-1" strike="noStrike">
+                <a:solidFill>
+                  <a:srgbClr val="7f7f7f"/>
+                </a:solidFill>
+                <a:uFill>
+                  <a:solidFill>
+                    <a:srgbClr val="ffffff"/>
+                  </a:solidFill>
+                </a:uFill>
+                <a:latin typeface="Arial"/>
+                <a:ea typeface="DejaVu Sans"/>
+              </a:rPr>
+              <a:t>e</a:t>
+            </a:r>
+            <a:r>
+              <a:rPr b="0" lang="en-US" sz="700" spc="-1" strike="noStrike">
+                <a:solidFill>
+                  <a:srgbClr val="7f7f7f"/>
+                </a:solidFill>
+                <a:uFill>
+                  <a:solidFill>
+                    <a:srgbClr val="ffffff"/>
+                  </a:solidFill>
+                </a:uFill>
+                <a:latin typeface="Arial"/>
+                <a:ea typeface="DejaVu Sans"/>
+              </a:rPr>
+              <a:t>y</a:t>
+            </a:r>
+            <a:r>
+              <a:rPr b="0" lang="en-US" sz="700" spc="-1" strike="noStrike">
+                <a:solidFill>
+                  <a:srgbClr val="7f7f7f"/>
+                </a:solidFill>
+                <a:uFill>
+                  <a:solidFill>
+                    <a:srgbClr val="ffffff"/>
+                  </a:solidFill>
+                </a:uFill>
+                <a:latin typeface="Arial"/>
+                <a:ea typeface="DejaVu Sans"/>
+              </a:rPr>
+              <a:t>w</a:t>
+            </a:r>
+            <a:r>
+              <a:rPr b="0" lang="en-US" sz="700" spc="-1" strike="noStrike">
+                <a:solidFill>
+                  <a:srgbClr val="7f7f7f"/>
+                </a:solidFill>
+                <a:uFill>
+                  <a:solidFill>
+                    <a:srgbClr val="ffffff"/>
+                  </a:solidFill>
+                </a:uFill>
+                <a:latin typeface="Arial"/>
+                <a:ea typeface="DejaVu Sans"/>
+              </a:rPr>
+              <a:t>e</a:t>
+            </a:r>
+            <a:r>
+              <a:rPr b="0" lang="en-US" sz="700" spc="-1" strike="noStrike">
+                <a:solidFill>
+                  <a:srgbClr val="7f7f7f"/>
+                </a:solidFill>
+                <a:uFill>
+                  <a:solidFill>
+                    <a:srgbClr val="ffffff"/>
+                  </a:solidFill>
+                </a:uFill>
+                <a:latin typeface="Arial"/>
+                <a:ea typeface="DejaVu Sans"/>
+              </a:rPr>
+              <a:t>ll </a:t>
+            </a:r>
+            <a:r>
+              <a:rPr b="0" lang="en-US" sz="700" spc="-1" strike="noStrike">
+                <a:solidFill>
+                  <a:srgbClr val="7f7f7f"/>
+                </a:solidFill>
+                <a:uFill>
+                  <a:solidFill>
+                    <a:srgbClr val="ffffff"/>
+                  </a:solidFill>
+                </a:uFill>
+                <a:latin typeface="Arial"/>
+                <a:ea typeface="DejaVu Sans"/>
+              </a:rPr>
+              <a:t>I</a:t>
+            </a:r>
+            <a:r>
+              <a:rPr b="0" lang="en-US" sz="700" spc="-1" strike="noStrike">
+                <a:solidFill>
+                  <a:srgbClr val="7f7f7f"/>
+                </a:solidFill>
+                <a:uFill>
+                  <a:solidFill>
+                    <a:srgbClr val="ffffff"/>
+                  </a:solidFill>
+                </a:uFill>
+                <a:latin typeface="Arial"/>
+                <a:ea typeface="DejaVu Sans"/>
+              </a:rPr>
+              <a:t>n</a:t>
+            </a:r>
+            <a:r>
+              <a:rPr b="0" lang="en-US" sz="700" spc="-1" strike="noStrike">
+                <a:solidFill>
+                  <a:srgbClr val="7f7f7f"/>
+                </a:solidFill>
+                <a:uFill>
+                  <a:solidFill>
+                    <a:srgbClr val="ffffff"/>
+                  </a:solidFill>
+                </a:uFill>
+                <a:latin typeface="Arial"/>
+                <a:ea typeface="DejaVu Sans"/>
+              </a:rPr>
+              <a:t>t</a:t>
+            </a:r>
+            <a:r>
+              <a:rPr b="0" lang="en-US" sz="700" spc="-1" strike="noStrike">
+                <a:solidFill>
+                  <a:srgbClr val="7f7f7f"/>
+                </a:solidFill>
+                <a:uFill>
+                  <a:solidFill>
+                    <a:srgbClr val="ffffff"/>
+                  </a:solidFill>
+                </a:uFill>
+                <a:latin typeface="Arial"/>
+                <a:ea typeface="DejaVu Sans"/>
+              </a:rPr>
+              <a:t>e</a:t>
+            </a:r>
+            <a:r>
+              <a:rPr b="0" lang="en-US" sz="700" spc="-1" strike="noStrike">
+                <a:solidFill>
+                  <a:srgbClr val="7f7f7f"/>
+                </a:solidFill>
+                <a:uFill>
+                  <a:solidFill>
+                    <a:srgbClr val="ffffff"/>
+                  </a:solidFill>
+                </a:uFill>
+                <a:latin typeface="Arial"/>
+                <a:ea typeface="DejaVu Sans"/>
+              </a:rPr>
+              <a:t>r</a:t>
+            </a:r>
+            <a:r>
+              <a:rPr b="0" lang="en-US" sz="700" spc="-1" strike="noStrike">
+                <a:solidFill>
+                  <a:srgbClr val="7f7f7f"/>
+                </a:solidFill>
+                <a:uFill>
+                  <a:solidFill>
+                    <a:srgbClr val="ffffff"/>
+                  </a:solidFill>
+                </a:uFill>
+                <a:latin typeface="Arial"/>
+                <a:ea typeface="DejaVu Sans"/>
+              </a:rPr>
+              <a:t>n</a:t>
+            </a:r>
+            <a:r>
+              <a:rPr b="0" lang="en-US" sz="700" spc="-1" strike="noStrike">
+                <a:solidFill>
+                  <a:srgbClr val="7f7f7f"/>
+                </a:solidFill>
+                <a:uFill>
+                  <a:solidFill>
+                    <a:srgbClr val="ffffff"/>
+                  </a:solidFill>
+                </a:uFill>
+                <a:latin typeface="Arial"/>
+                <a:ea typeface="DejaVu Sans"/>
+              </a:rPr>
+              <a:t>a</a:t>
+            </a:r>
+            <a:r>
+              <a:rPr b="0" lang="en-US" sz="700" spc="-1" strike="noStrike">
+                <a:solidFill>
+                  <a:srgbClr val="7f7f7f"/>
+                </a:solidFill>
+                <a:uFill>
+                  <a:solidFill>
+                    <a:srgbClr val="ffffff"/>
+                  </a:solidFill>
+                </a:uFill>
+                <a:latin typeface="Arial"/>
+                <a:ea typeface="DejaVu Sans"/>
+              </a:rPr>
+              <a:t>l</a:t>
             </a:r>
             <a:endParaRPr b="0" lang="en-US" sz="1800" spc="-1" strike="noStrike">
               <a:solidFill>
@@ -19869,6 +20356,270 @@
             </a:endParaRPr>
           </a:p>
         </p:txBody>
+      </p:sp>
+      <p:sp>
+        <p:nvSpPr>
+          <p:cNvPr id="310" name="Line 3"/>
+          <p:cNvSpPr/>
+          <p:nvPr/>
+        </p:nvSpPr>
+        <p:spPr>
+          <a:xfrm flipV="1">
+            <a:off x="1097280" y="4389120"/>
+            <a:ext cx="2286000" cy="360"/>
+          </a:xfrm>
+          <a:prstGeom prst="line">
+            <a:avLst/>
+          </a:prstGeom>
+          <a:ln>
+            <a:solidFill>
+              <a:srgbClr val="000000"/>
+            </a:solidFill>
+            <a:tailEnd len="med" type="triangle" w="med"/>
+          </a:ln>
+        </p:spPr>
+        <p:style>
+          <a:lnRef idx="0"/>
+          <a:fillRef idx="0"/>
+          <a:effectRef idx="0"/>
+          <a:fontRef idx="minor"/>
+        </p:style>
+      </p:sp>
+      <p:sp>
+        <p:nvSpPr>
+          <p:cNvPr id="311" name="Line 4"/>
+          <p:cNvSpPr/>
+          <p:nvPr/>
+        </p:nvSpPr>
+        <p:spPr>
+          <a:xfrm>
+            <a:off x="1097280" y="1573920"/>
+            <a:ext cx="0" cy="2815200"/>
+          </a:xfrm>
+          <a:prstGeom prst="line">
+            <a:avLst/>
+          </a:prstGeom>
+          <a:ln>
+            <a:solidFill>
+              <a:srgbClr val="000000"/>
+            </a:solidFill>
+          </a:ln>
+        </p:spPr>
+        <p:style>
+          <a:lnRef idx="0"/>
+          <a:fillRef idx="0"/>
+          <a:effectRef idx="0"/>
+          <a:fontRef idx="minor"/>
+        </p:style>
+      </p:sp>
+      <p:sp>
+        <p:nvSpPr>
+          <p:cNvPr id="312" name="Line 5"/>
+          <p:cNvSpPr/>
+          <p:nvPr/>
+        </p:nvSpPr>
+        <p:spPr>
+          <a:xfrm>
+            <a:off x="1097280" y="1573920"/>
+            <a:ext cx="241560" cy="0"/>
+          </a:xfrm>
+          <a:prstGeom prst="line">
+            <a:avLst/>
+          </a:prstGeom>
+          <a:ln>
+            <a:solidFill>
+              <a:srgbClr val="000000"/>
+            </a:solidFill>
+          </a:ln>
+        </p:spPr>
+        <p:style>
+          <a:lnRef idx="0"/>
+          <a:fillRef idx="0"/>
+          <a:effectRef idx="0"/>
+          <a:fontRef idx="minor"/>
+        </p:style>
+      </p:sp>
+      <p:sp>
+        <p:nvSpPr>
+          <p:cNvPr id="313" name="TextShape 6"/>
+          <p:cNvSpPr txBox="1"/>
+          <p:nvPr/>
+        </p:nvSpPr>
+        <p:spPr>
+          <a:xfrm>
+            <a:off x="1339200" y="1188720"/>
+            <a:ext cx="4604400" cy="1114200"/>
+          </a:xfrm>
+          <a:prstGeom prst="rect">
+            <a:avLst/>
+          </a:prstGeom>
+          <a:noFill/>
+          <a:ln>
+            <a:noFill/>
+          </a:ln>
+        </p:spPr>
+        <p:txBody>
+          <a:bodyPr lIns="90000" rIns="90000" tIns="45000" bIns="45000"/>
+          <a:p>
+            <a:r>
+              <a:rPr b="0" lang="en-US" sz="1800" spc="-1" strike="noStrike">
+                <a:solidFill>
+                  <a:srgbClr val="000000"/>
+                </a:solidFill>
+                <a:uFill>
+                  <a:solidFill>
+                    <a:srgbClr val="ffffff"/>
+                  </a:solidFill>
+                </a:uFill>
+                <a:latin typeface="Arial"/>
+              </a:rPr>
+              <a:t>MPC Trajectory Generator is trapped and slows down to zero speed</a:t>
+            </a:r>
+            <a:endParaRPr b="0" lang="en-US" sz="1800" spc="-1" strike="noStrike">
+              <a:solidFill>
+                <a:srgbClr val="000000"/>
+              </a:solidFill>
+              <a:uFill>
+                <a:solidFill>
+                  <a:srgbClr val="ffffff"/>
+                </a:solidFill>
+              </a:uFill>
+              <a:latin typeface="Arial"/>
+            </a:endParaRPr>
+          </a:p>
+        </p:txBody>
+      </p:sp>
+      <p:sp>
+        <p:nvSpPr>
+          <p:cNvPr id="314" name="TextShape 7"/>
+          <p:cNvSpPr txBox="1"/>
+          <p:nvPr/>
+        </p:nvSpPr>
+        <p:spPr>
+          <a:xfrm>
+            <a:off x="6836400" y="1180440"/>
+            <a:ext cx="4022640" cy="858240"/>
+          </a:xfrm>
+          <a:prstGeom prst="rect">
+            <a:avLst/>
+          </a:prstGeom>
+          <a:noFill/>
+          <a:ln>
+            <a:noFill/>
+          </a:ln>
+        </p:spPr>
+        <p:txBody>
+          <a:bodyPr lIns="90000" rIns="90000" tIns="45000" bIns="45000"/>
+          <a:p>
+            <a:r>
+              <a:rPr b="0" lang="en-US" sz="1800" spc="-1" strike="noStrike">
+                <a:solidFill>
+                  <a:srgbClr val="000000"/>
+                </a:solidFill>
+                <a:uFill>
+                  <a:solidFill>
+                    <a:srgbClr val="ffffff"/>
+                  </a:solidFill>
+                </a:uFill>
+                <a:latin typeface="Arial"/>
+              </a:rPr>
+              <a:t>MPC Trajectory Generator successfully reaches the end point with relaxed turn constraints</a:t>
+            </a:r>
+            <a:endParaRPr b="0" lang="en-US" sz="1800" spc="-1" strike="noStrike">
+              <a:solidFill>
+                <a:srgbClr val="000000"/>
+              </a:solidFill>
+              <a:uFill>
+                <a:solidFill>
+                  <a:srgbClr val="ffffff"/>
+                </a:solidFill>
+              </a:uFill>
+              <a:latin typeface="Arial"/>
+            </a:endParaRPr>
+          </a:p>
+        </p:txBody>
+      </p:sp>
+      <p:sp>
+        <p:nvSpPr>
+          <p:cNvPr id="315" name="Line 8"/>
+          <p:cNvSpPr/>
+          <p:nvPr/>
+        </p:nvSpPr>
+        <p:spPr>
+          <a:xfrm>
+            <a:off x="10790280" y="1490040"/>
+            <a:ext cx="0" cy="2402640"/>
+          </a:xfrm>
+          <a:prstGeom prst="line">
+            <a:avLst/>
+          </a:prstGeom>
+          <a:ln>
+            <a:solidFill>
+              <a:srgbClr val="000000"/>
+            </a:solidFill>
+          </a:ln>
+        </p:spPr>
+        <p:style>
+          <a:lnRef idx="0"/>
+          <a:fillRef idx="0"/>
+          <a:effectRef idx="0"/>
+          <a:fontRef idx="minor"/>
+        </p:style>
+      </p:sp>
+      <p:sp>
+        <p:nvSpPr>
+          <p:cNvPr id="316" name="Line 9"/>
+          <p:cNvSpPr/>
+          <p:nvPr/>
+        </p:nvSpPr>
+        <p:spPr>
+          <a:xfrm>
+            <a:off x="10548720" y="1490040"/>
+            <a:ext cx="241560" cy="0"/>
+          </a:xfrm>
+          <a:prstGeom prst="line">
+            <a:avLst/>
+          </a:prstGeom>
+          <a:ln>
+            <a:solidFill>
+              <a:srgbClr val="000000"/>
+            </a:solidFill>
+          </a:ln>
+        </p:spPr>
+        <p:style>
+          <a:lnRef idx="0"/>
+          <a:fillRef idx="0"/>
+          <a:effectRef idx="0"/>
+          <a:fontRef idx="minor"/>
+        </p:style>
+      </p:sp>
+      <p:sp>
+        <p:nvSpPr>
+          <p:cNvPr id="317" name="Line 10"/>
+          <p:cNvSpPr/>
+          <p:nvPr/>
+        </p:nvSpPr>
+        <p:spPr>
+          <a:xfrm flipH="1">
+            <a:off x="9052560" y="3892680"/>
+            <a:ext cx="1737720" cy="0"/>
+          </a:xfrm>
+          <a:prstGeom prst="line">
+            <a:avLst/>
+          </a:prstGeom>
+          <a:ln>
+            <a:solidFill>
+              <a:srgbClr val="000000"/>
+            </a:solidFill>
+            <a:tailEnd len="med" type="triangle" w="med"/>
+          </a:ln>
+        </p:spPr>
+        <p:style>
+          <a:lnRef idx="0"/>
+          <a:fillRef idx="0"/>
+          <a:effectRef idx="0"/>
+          <a:fontRef idx="minor"/>
+        </p:style>
       </p:sp>
     </p:spTree>
   </p:cSld>
@@ -19921,7 +20672,7 @@
       </p:grpSpPr>
       <p:sp>
         <p:nvSpPr>
-          <p:cNvPr id="309" name="CustomShape 1"/>
+          <p:cNvPr id="318" name="CustomShape 1"/>
           <p:cNvSpPr/>
           <p:nvPr/>
         </p:nvSpPr>
@@ -19965,7 +20716,7 @@
                 <a:latin typeface="Arial"/>
                 <a:ea typeface="Arial"/>
               </a:rPr>
-              <a:t>Q&amp;A</a:t>
+              <a:t>Future Work</a:t>
             </a:r>
             <a:endParaRPr b="0" lang="en-US" sz="1800" spc="-1" strike="noStrike">
               <a:solidFill>
@@ -19983,7 +20734,383 @@
       </p:sp>
       <p:sp>
         <p:nvSpPr>
-          <p:cNvPr id="310" name="CustomShape 2"/>
+          <p:cNvPr id="319" name="CustomShape 2"/>
+          <p:cNvSpPr/>
+          <p:nvPr/>
+        </p:nvSpPr>
+        <p:spPr>
+          <a:xfrm>
+            <a:off x="712800" y="992520"/>
+            <a:ext cx="9802800" cy="5221800"/>
+          </a:xfrm>
+          <a:prstGeom prst="rect">
+            <a:avLst/>
+          </a:prstGeom>
+          <a:noFill/>
+          <a:ln>
+            <a:noFill/>
+          </a:ln>
+        </p:spPr>
+        <p:style>
+          <a:lnRef idx="0"/>
+          <a:fillRef idx="0"/>
+          <a:effectRef idx="0"/>
+          <a:fontRef idx="minor"/>
+        </p:style>
+        <p:txBody>
+          <a:bodyPr lIns="90000" rIns="90000" tIns="45000" bIns="45000"/>
+          <a:p>
+            <a:pPr marL="169920" indent="-169200">
+              <a:lnSpc>
+                <a:spcPct val="100000"/>
+              </a:lnSpc>
+              <a:buClr>
+                <a:srgbClr val="c00000"/>
+              </a:buClr>
+              <a:buFont typeface="Arial"/>
+              <a:buChar char="•"/>
+            </a:pPr>
+            <a:r>
+              <a:rPr b="0" lang="en-US" sz="2000" spc="-1" strike="noStrike">
+                <a:solidFill>
+                  <a:srgbClr val="000000"/>
+                </a:solidFill>
+                <a:uFill>
+                  <a:solidFill>
+                    <a:srgbClr val="ffffff"/>
+                  </a:solidFill>
+                </a:uFill>
+                <a:latin typeface="Arial"/>
+                <a:ea typeface="Arial"/>
+              </a:rPr>
+              <a:t>MPC Trajectory Generator solves a non-linear optimization problem which cannot guarantee a solution at every time step.</a:t>
+            </a:r>
+            <a:endParaRPr b="0" lang="en-US" sz="1800" spc="-1" strike="noStrike">
+              <a:solidFill>
+                <a:srgbClr val="000000"/>
+              </a:solidFill>
+              <a:uFill>
+                <a:solidFill>
+                  <a:srgbClr val="ffffff"/>
+                </a:solidFill>
+              </a:uFill>
+              <a:latin typeface="Arial"/>
+            </a:endParaRPr>
+          </a:p>
+          <a:p>
+            <a:pPr marL="169920" indent="-169200">
+              <a:lnSpc>
+                <a:spcPct val="100000"/>
+              </a:lnSpc>
+              <a:buClr>
+                <a:srgbClr val="c00000"/>
+              </a:buClr>
+              <a:buFont typeface="Arial"/>
+              <a:buChar char="•"/>
+            </a:pPr>
+            <a:r>
+              <a:rPr b="0" lang="en-US" sz="2000" spc="-1" strike="noStrike">
+                <a:solidFill>
+                  <a:srgbClr val="000000"/>
+                </a:solidFill>
+                <a:uFill>
+                  <a:solidFill>
+                    <a:srgbClr val="ffffff"/>
+                  </a:solidFill>
+                </a:uFill>
+                <a:latin typeface="Arial"/>
+                <a:ea typeface="Arial"/>
+              </a:rPr>
+              <a:t>To obtained a guaranteed solution we will look at the following approaches:</a:t>
+            </a:r>
+            <a:endParaRPr b="0" lang="en-US" sz="1800" spc="-1" strike="noStrike">
+              <a:solidFill>
+                <a:srgbClr val="000000"/>
+              </a:solidFill>
+              <a:uFill>
+                <a:solidFill>
+                  <a:srgbClr val="ffffff"/>
+                </a:solidFill>
+              </a:uFill>
+              <a:latin typeface="Arial"/>
+            </a:endParaRPr>
+          </a:p>
+          <a:p>
+            <a:pPr lvl="1" marL="864000" indent="-323640">
+              <a:lnSpc>
+                <a:spcPct val="100000"/>
+              </a:lnSpc>
+              <a:buClr>
+                <a:srgbClr val="000000"/>
+              </a:buClr>
+              <a:buSzPct val="75000"/>
+              <a:buFont typeface="Symbol"/>
+              <a:buChar char=""/>
+            </a:pPr>
+            <a:r>
+              <a:rPr b="0" lang="en-US" sz="1600" spc="-1" strike="noStrike">
+                <a:solidFill>
+                  <a:srgbClr val="000000"/>
+                </a:solidFill>
+                <a:uFill>
+                  <a:solidFill>
+                    <a:srgbClr val="ffffff"/>
+                  </a:solidFill>
+                </a:uFill>
+                <a:latin typeface="Arial"/>
+                <a:ea typeface="Arial"/>
+              </a:rPr>
+              <a:t>Approximate optimization problem formulation using linearized vehicle dynamics and linear constraints</a:t>
+            </a:r>
+            <a:endParaRPr b="0" lang="en-US" sz="1800" spc="-1" strike="noStrike">
+              <a:solidFill>
+                <a:srgbClr val="000000"/>
+              </a:solidFill>
+              <a:uFill>
+                <a:solidFill>
+                  <a:srgbClr val="ffffff"/>
+                </a:solidFill>
+              </a:uFill>
+              <a:latin typeface="Arial"/>
+            </a:endParaRPr>
+          </a:p>
+          <a:p>
+            <a:pPr lvl="1" marL="864000" indent="-323640">
+              <a:lnSpc>
+                <a:spcPct val="100000"/>
+              </a:lnSpc>
+              <a:buClr>
+                <a:srgbClr val="000000"/>
+              </a:buClr>
+              <a:buSzPct val="75000"/>
+              <a:buFont typeface="Symbol"/>
+              <a:buChar char=""/>
+            </a:pPr>
+            <a:r>
+              <a:rPr b="0" lang="en-US" sz="1600" spc="-1" strike="noStrike">
+                <a:solidFill>
+                  <a:srgbClr val="000000"/>
+                </a:solidFill>
+                <a:uFill>
+                  <a:solidFill>
+                    <a:srgbClr val="ffffff"/>
+                  </a:solidFill>
+                </a:uFill>
+                <a:latin typeface="Arial"/>
+                <a:ea typeface="Arial"/>
+              </a:rPr>
+              <a:t>Modify problem formulation to allow velocity reversal</a:t>
+            </a:r>
+            <a:endParaRPr b="0" lang="en-US" sz="1800" spc="-1" strike="noStrike">
+              <a:solidFill>
+                <a:srgbClr val="000000"/>
+              </a:solidFill>
+              <a:uFill>
+                <a:solidFill>
+                  <a:srgbClr val="ffffff"/>
+                </a:solidFill>
+              </a:uFill>
+              <a:latin typeface="Arial"/>
+            </a:endParaRPr>
+          </a:p>
+          <a:p>
+            <a:pPr lvl="1" marL="864000" indent="-323640">
+              <a:lnSpc>
+                <a:spcPct val="100000"/>
+              </a:lnSpc>
+              <a:buClr>
+                <a:srgbClr val="000000"/>
+              </a:buClr>
+              <a:buSzPct val="75000"/>
+              <a:buFont typeface="Symbol"/>
+              <a:buChar char=""/>
+            </a:pPr>
+            <a:r>
+              <a:rPr b="0" lang="en-US" sz="1600" spc="-1" strike="noStrike">
+                <a:solidFill>
+                  <a:srgbClr val="000000"/>
+                </a:solidFill>
+                <a:uFill>
+                  <a:solidFill>
+                    <a:srgbClr val="ffffff"/>
+                  </a:solidFill>
+                </a:uFill>
+                <a:latin typeface="Arial"/>
+                <a:ea typeface="Arial"/>
+              </a:rPr>
+              <a:t>Continue on the MPC path computed in the previous time step and run a  less costly global planner (e.g., Probabilistic Road Maps) to re-initialize the MPC problem</a:t>
+            </a:r>
+            <a:endParaRPr b="0" lang="en-US" sz="1800" spc="-1" strike="noStrike">
+              <a:solidFill>
+                <a:srgbClr val="000000"/>
+              </a:solidFill>
+              <a:uFill>
+                <a:solidFill>
+                  <a:srgbClr val="ffffff"/>
+                </a:solidFill>
+              </a:uFill>
+              <a:latin typeface="Arial"/>
+            </a:endParaRPr>
+          </a:p>
+          <a:p>
+            <a:pPr marL="169920" indent="-169200">
+              <a:lnSpc>
+                <a:spcPct val="100000"/>
+              </a:lnSpc>
+              <a:buClr>
+                <a:srgbClr val="c00000"/>
+              </a:buClr>
+              <a:buFont typeface="Arial"/>
+              <a:buChar char="•"/>
+            </a:pPr>
+            <a:r>
+              <a:rPr b="0" lang="en-US" sz="2000" spc="-1" strike="noStrike">
+                <a:solidFill>
+                  <a:srgbClr val="000000"/>
+                </a:solidFill>
+                <a:uFill>
+                  <a:solidFill>
+                    <a:srgbClr val="ffffff"/>
+                  </a:solidFill>
+                </a:uFill>
+                <a:latin typeface="Arial"/>
+                <a:ea typeface="Arial"/>
+              </a:rPr>
+              <a:t>Current MPC trajectory generator is not optimized to run in real time</a:t>
+            </a:r>
+            <a:endParaRPr b="0" lang="en-US" sz="1800" spc="-1" strike="noStrike">
+              <a:solidFill>
+                <a:srgbClr val="000000"/>
+              </a:solidFill>
+              <a:uFill>
+                <a:solidFill>
+                  <a:srgbClr val="ffffff"/>
+                </a:solidFill>
+              </a:uFill>
+              <a:latin typeface="Arial"/>
+            </a:endParaRPr>
+          </a:p>
+          <a:p>
+            <a:pPr marL="169920" indent="-169200">
+              <a:lnSpc>
+                <a:spcPct val="100000"/>
+              </a:lnSpc>
+              <a:buClr>
+                <a:srgbClr val="c00000"/>
+              </a:buClr>
+              <a:buFont typeface="Arial"/>
+              <a:buChar char="•"/>
+            </a:pPr>
+            <a:r>
+              <a:rPr b="0" lang="en-US" sz="2000" spc="-1" strike="noStrike">
+                <a:solidFill>
+                  <a:srgbClr val="000000"/>
+                </a:solidFill>
+                <a:uFill>
+                  <a:solidFill>
+                    <a:srgbClr val="ffffff"/>
+                  </a:solidFill>
+                </a:uFill>
+                <a:latin typeface="Arial"/>
+                <a:ea typeface="Arial"/>
+              </a:rPr>
+              <a:t>To obtain real-time performance we will look at the following approaches:</a:t>
+            </a:r>
+            <a:endParaRPr b="0" lang="en-US" sz="1800" spc="-1" strike="noStrike">
+              <a:solidFill>
+                <a:srgbClr val="000000"/>
+              </a:solidFill>
+              <a:uFill>
+                <a:solidFill>
+                  <a:srgbClr val="ffffff"/>
+                </a:solidFill>
+              </a:uFill>
+              <a:latin typeface="Arial"/>
+            </a:endParaRPr>
+          </a:p>
+          <a:p>
+            <a:pPr lvl="1" marL="864000" indent="-323640">
+              <a:lnSpc>
+                <a:spcPct val="100000"/>
+              </a:lnSpc>
+              <a:buClr>
+                <a:srgbClr val="000000"/>
+              </a:buClr>
+              <a:buSzPct val="75000"/>
+              <a:buFont typeface="Symbol"/>
+              <a:buChar char=""/>
+            </a:pPr>
+            <a:r>
+              <a:rPr b="0" lang="en-US" sz="1600" spc="-1" strike="noStrike">
+                <a:solidFill>
+                  <a:srgbClr val="000000"/>
+                </a:solidFill>
+                <a:uFill>
+                  <a:solidFill>
+                    <a:srgbClr val="ffffff"/>
+                  </a:solidFill>
+                </a:uFill>
+                <a:latin typeface="Arial"/>
+                <a:ea typeface="Arial"/>
+              </a:rPr>
+              <a:t>Use near-optimal values to reduce the number of iterations</a:t>
+            </a:r>
+            <a:endParaRPr b="0" lang="en-US" sz="1800" spc="-1" strike="noStrike">
+              <a:solidFill>
+                <a:srgbClr val="000000"/>
+              </a:solidFill>
+              <a:uFill>
+                <a:solidFill>
+                  <a:srgbClr val="ffffff"/>
+                </a:solidFill>
+              </a:uFill>
+              <a:latin typeface="Arial"/>
+            </a:endParaRPr>
+          </a:p>
+          <a:p>
+            <a:pPr lvl="1" marL="864000" indent="-323640">
+              <a:lnSpc>
+                <a:spcPct val="100000"/>
+              </a:lnSpc>
+              <a:buClr>
+                <a:srgbClr val="000000"/>
+              </a:buClr>
+              <a:buSzPct val="75000"/>
+              <a:buFont typeface="Symbol"/>
+              <a:buChar char=""/>
+            </a:pPr>
+            <a:r>
+              <a:rPr b="0" lang="en-US" sz="1600" spc="-1" strike="noStrike">
+                <a:solidFill>
+                  <a:srgbClr val="000000"/>
+                </a:solidFill>
+                <a:uFill>
+                  <a:solidFill>
+                    <a:srgbClr val="ffffff"/>
+                  </a:solidFill>
+                </a:uFill>
+                <a:latin typeface="Arial"/>
+                <a:ea typeface="Arial"/>
+              </a:rPr>
+              <a:t>Use efficient linear solvers which is used by the nonlinear optimizer </a:t>
+            </a:r>
+            <a:endParaRPr b="0" lang="en-US" sz="1800" spc="-1" strike="noStrike">
+              <a:solidFill>
+                <a:srgbClr val="000000"/>
+              </a:solidFill>
+              <a:uFill>
+                <a:solidFill>
+                  <a:srgbClr val="ffffff"/>
+                </a:solidFill>
+              </a:uFill>
+              <a:latin typeface="Arial"/>
+            </a:endParaRPr>
+          </a:p>
+        </p:txBody>
+      </p:sp>
+      <p:sp>
+        <p:nvSpPr>
+          <p:cNvPr id="320" name="CustomShape 3"/>
           <p:cNvSpPr/>
           <p:nvPr/>
         </p:nvSpPr>
@@ -20094,7 +21221,7 @@
       </p:grpSpPr>
       <p:sp>
         <p:nvSpPr>
-          <p:cNvPr id="311" name="CustomShape 1"/>
+          <p:cNvPr id="321" name="CustomShape 1"/>
           <p:cNvSpPr/>
           <p:nvPr/>
         </p:nvSpPr>
@@ -20156,7 +21283,7 @@
       </p:sp>
       <p:sp>
         <p:nvSpPr>
-          <p:cNvPr id="312" name="CustomShape 2"/>
+          <p:cNvPr id="322" name="CustomShape 2"/>
           <p:cNvSpPr/>
           <p:nvPr/>
         </p:nvSpPr>

</xml_diff>